<commit_message>
Make skeleton for the goal progress panel
</commit_message>
<xml_diff>
--- a/Z_Admin/dashboard_plan.pptx
+++ b/Z_Admin/dashboard_plan.pptx
@@ -107,6 +107,11 @@
       </a:defRPr>
     </a:lvl9pPr>
   </p:defaultTextStyle>
+  <p:extLst>
+    <p:ext uri="{EFAFB233-063F-42B5-8137-9DF3F51BA10A}">
+      <p15:sldGuideLst xmlns:p15="http://schemas.microsoft.com/office/powerpoint/2012/main"/>
+    </p:ext>
+  </p:extLst>
 </p:presentation>
 </file>
 
@@ -192,7 +197,7 @@
           <a:p>
             <a:fld id="{5FB880A3-9387-D242-9A38-B2BD8C4605C2}" type="datetimeFigureOut">
               <a:rPr lang="en-US" smtClean="0"/>
-              <a:t>2/7/22</a:t>
+              <a:t>2/15/22</a:t>
             </a:fld>
             <a:endParaRPr lang="en-US"/>
           </a:p>
@@ -1170,7 +1175,7 @@
         </p:nvSpPr>
         <p:spPr>
           <a:xfrm>
-            <a:off x="0" y="7315200"/>
+            <a:off x="10972800" y="14588836"/>
             <a:ext cx="10972800" cy="7315200"/>
           </a:xfrm>
           <a:prstGeom prst="rect">
@@ -1290,7 +1295,7 @@
         </p:nvSpPr>
         <p:spPr>
           <a:xfrm>
-            <a:off x="0" y="14630400"/>
+            <a:off x="0" y="7315200"/>
             <a:ext cx="10972800" cy="7315200"/>
           </a:xfrm>
           <a:prstGeom prst="rect">
@@ -1431,7 +1436,7 @@
         </p:nvSpPr>
         <p:spPr>
           <a:xfrm>
-            <a:off x="10972800" y="14630400"/>
+            <a:off x="0" y="14588836"/>
             <a:ext cx="10972800" cy="7315200"/>
           </a:xfrm>
           <a:prstGeom prst="rect">

</xml_diff>

<commit_message>
Improve explanation panel skeleton
</commit_message>
<xml_diff>
--- a/Z_Admin/dashboard_plan.pptx
+++ b/Z_Admin/dashboard_plan.pptx
@@ -197,7 +197,7 @@
           <a:p>
             <a:fld id="{5FB880A3-9387-D242-9A38-B2BD8C4605C2}" type="datetimeFigureOut">
               <a:rPr lang="en-US" smtClean="0"/>
-              <a:t>2/15/22</a:t>
+              <a:t>2/16/22</a:t>
             </a:fld>
             <a:endParaRPr lang="en-US"/>
           </a:p>
@@ -932,9 +932,8 @@
             <a:avLst/>
           </a:prstGeom>
           <a:solidFill>
-            <a:schemeClr val="accent1">
-              <a:lumMod val="20000"/>
-              <a:lumOff val="80000"/>
+            <a:schemeClr val="bg2">
+              <a:lumMod val="50000"/>
             </a:schemeClr>
           </a:solidFill>
           <a:ln>
@@ -1056,8 +1055,8 @@
             <a:avLst/>
           </a:prstGeom>
           <a:solidFill>
-            <a:schemeClr val="bg1">
-              <a:lumMod val="95000"/>
+            <a:schemeClr val="bg2">
+              <a:lumMod val="50000"/>
             </a:schemeClr>
           </a:solidFill>
           <a:ln>
@@ -1175,15 +1174,15 @@
         </p:nvSpPr>
         <p:spPr>
           <a:xfrm>
-            <a:off x="10972800" y="14588836"/>
+            <a:off x="10972800" y="14630400"/>
             <a:ext cx="10972800" cy="7315200"/>
           </a:xfrm>
           <a:prstGeom prst="rect">
             <a:avLst/>
           </a:prstGeom>
           <a:solidFill>
-            <a:schemeClr val="bg1">
-              <a:lumMod val="85000"/>
+            <a:schemeClr val="bg2">
+              <a:lumMod val="50000"/>
             </a:schemeClr>
           </a:solidFill>
           <a:ln>
@@ -1302,8 +1301,8 @@
             <a:avLst/>
           </a:prstGeom>
           <a:solidFill>
-            <a:schemeClr val="bg1">
-              <a:lumMod val="95000"/>
+            <a:schemeClr val="bg2">
+              <a:lumMod val="50000"/>
             </a:schemeClr>
           </a:solidFill>
           <a:ln>
@@ -1436,15 +1435,15 @@
         </p:nvSpPr>
         <p:spPr>
           <a:xfrm>
-            <a:off x="0" y="14588836"/>
+            <a:off x="0" y="14630400"/>
             <a:ext cx="10972800" cy="7315200"/>
           </a:xfrm>
           <a:prstGeom prst="rect">
             <a:avLst/>
           </a:prstGeom>
           <a:solidFill>
-            <a:schemeClr val="bg1">
-              <a:lumMod val="85000"/>
+            <a:schemeClr val="bg2">
+              <a:lumMod val="50000"/>
             </a:schemeClr>
           </a:solidFill>
           <a:ln>
@@ -1591,8 +1590,8 @@
             <a:avLst/>
           </a:prstGeom>
           <a:solidFill>
-            <a:schemeClr val="bg1">
-              <a:lumMod val="95000"/>
+            <a:schemeClr val="bg2">
+              <a:lumMod val="50000"/>
             </a:schemeClr>
           </a:solidFill>
           <a:ln>

</xml_diff>